<commit_message>
PGSTE and PGSE equations using square gradient pulses
symbolic algebra notebooks to calculate diffusion equation for PGSTE and
PGSE pulse sequences
</commit_message>
<xml_diff>
--- a/diffEquations/ctp_diagram.pptx
+++ b/diffEquations/ctp_diagram.pptx
@@ -6,8 +6,9 @@
   </p:sldMasterIdLst>
   <p:sldIdLst>
     <p:sldId id="256" r:id="rId2"/>
-    <p:sldId id="257" r:id="rId3"/>
-    <p:sldId id="258" r:id="rId4"/>
+    <p:sldId id="259" r:id="rId3"/>
+    <p:sldId id="257" r:id="rId4"/>
+    <p:sldId id="258" r:id="rId5"/>
   </p:sldIdLst>
   <p:sldSz cx="6858000" cy="9144000" type="screen4x3"/>
   <p:notesSz cx="6858000" cy="9144000"/>
@@ -290,7 +291,7 @@
           <a:p>
             <a:fld id="{FB87D148-7C0B-419A-AD9B-FB33B3382C04}" type="datetimeFigureOut">
               <a:rPr lang="en-GB" smtClean="0"/>
-              <a:t>07/08/2015</a:t>
+              <a:t>18/04/2016</a:t>
             </a:fld>
             <a:endParaRPr lang="en-GB"/>
           </a:p>
@@ -460,7 +461,7 @@
           <a:p>
             <a:fld id="{FB87D148-7C0B-419A-AD9B-FB33B3382C04}" type="datetimeFigureOut">
               <a:rPr lang="en-GB" smtClean="0"/>
-              <a:t>07/08/2015</a:t>
+              <a:t>18/04/2016</a:t>
             </a:fld>
             <a:endParaRPr lang="en-GB"/>
           </a:p>
@@ -640,7 +641,7 @@
           <a:p>
             <a:fld id="{FB87D148-7C0B-419A-AD9B-FB33B3382C04}" type="datetimeFigureOut">
               <a:rPr lang="en-GB" smtClean="0"/>
-              <a:t>07/08/2015</a:t>
+              <a:t>18/04/2016</a:t>
             </a:fld>
             <a:endParaRPr lang="en-GB"/>
           </a:p>
@@ -810,7 +811,7 @@
           <a:p>
             <a:fld id="{FB87D148-7C0B-419A-AD9B-FB33B3382C04}" type="datetimeFigureOut">
               <a:rPr lang="en-GB" smtClean="0"/>
-              <a:t>07/08/2015</a:t>
+              <a:t>18/04/2016</a:t>
             </a:fld>
             <a:endParaRPr lang="en-GB"/>
           </a:p>
@@ -1056,7 +1057,7 @@
           <a:p>
             <a:fld id="{FB87D148-7C0B-419A-AD9B-FB33B3382C04}" type="datetimeFigureOut">
               <a:rPr lang="en-GB" smtClean="0"/>
-              <a:t>07/08/2015</a:t>
+              <a:t>18/04/2016</a:t>
             </a:fld>
             <a:endParaRPr lang="en-GB"/>
           </a:p>
@@ -1344,7 +1345,7 @@
           <a:p>
             <a:fld id="{FB87D148-7C0B-419A-AD9B-FB33B3382C04}" type="datetimeFigureOut">
               <a:rPr lang="en-GB" smtClean="0"/>
-              <a:t>07/08/2015</a:t>
+              <a:t>18/04/2016</a:t>
             </a:fld>
             <a:endParaRPr lang="en-GB"/>
           </a:p>
@@ -1766,7 +1767,7 @@
           <a:p>
             <a:fld id="{FB87D148-7C0B-419A-AD9B-FB33B3382C04}" type="datetimeFigureOut">
               <a:rPr lang="en-GB" smtClean="0"/>
-              <a:t>07/08/2015</a:t>
+              <a:t>18/04/2016</a:t>
             </a:fld>
             <a:endParaRPr lang="en-GB"/>
           </a:p>
@@ -1884,7 +1885,7 @@
           <a:p>
             <a:fld id="{FB87D148-7C0B-419A-AD9B-FB33B3382C04}" type="datetimeFigureOut">
               <a:rPr lang="en-GB" smtClean="0"/>
-              <a:t>07/08/2015</a:t>
+              <a:t>18/04/2016</a:t>
             </a:fld>
             <a:endParaRPr lang="en-GB"/>
           </a:p>
@@ -1979,7 +1980,7 @@
           <a:p>
             <a:fld id="{FB87D148-7C0B-419A-AD9B-FB33B3382C04}" type="datetimeFigureOut">
               <a:rPr lang="en-GB" smtClean="0"/>
-              <a:t>07/08/2015</a:t>
+              <a:t>18/04/2016</a:t>
             </a:fld>
             <a:endParaRPr lang="en-GB"/>
           </a:p>
@@ -2256,7 +2257,7 @@
           <a:p>
             <a:fld id="{FB87D148-7C0B-419A-AD9B-FB33B3382C04}" type="datetimeFigureOut">
               <a:rPr lang="en-GB" smtClean="0"/>
-              <a:t>07/08/2015</a:t>
+              <a:t>18/04/2016</a:t>
             </a:fld>
             <a:endParaRPr lang="en-GB"/>
           </a:p>
@@ -2509,7 +2510,7 @@
           <a:p>
             <a:fld id="{FB87D148-7C0B-419A-AD9B-FB33B3382C04}" type="datetimeFigureOut">
               <a:rPr lang="en-GB" smtClean="0"/>
-              <a:t>07/08/2015</a:t>
+              <a:t>18/04/2016</a:t>
             </a:fld>
             <a:endParaRPr lang="en-GB"/>
           </a:p>
@@ -2722,7 +2723,7 @@
           <a:p>
             <a:fld id="{FB87D148-7C0B-419A-AD9B-FB33B3382C04}" type="datetimeFigureOut">
               <a:rPr lang="en-GB" smtClean="0"/>
-              <a:t>07/08/2015</a:t>
+              <a:t>18/04/2016</a:t>
             </a:fld>
             <a:endParaRPr lang="en-GB"/>
           </a:p>
@@ -5703,6 +5704,2413 @@
           <a:chExt cx="0" cy="0"/>
         </a:xfrm>
       </p:grpSpPr>
+      <p:grpSp>
+        <p:nvGrpSpPr>
+          <p:cNvPr id="161" name="Group 160"/>
+          <p:cNvGrpSpPr/>
+          <p:nvPr/>
+        </p:nvGrpSpPr>
+        <p:grpSpPr>
+          <a:xfrm>
+            <a:off x="836712" y="3779912"/>
+            <a:ext cx="5138257" cy="3106216"/>
+            <a:chOff x="836712" y="3779912"/>
+            <a:chExt cx="5138257" cy="3106216"/>
+          </a:xfrm>
+        </p:grpSpPr>
+        <p:cxnSp>
+          <p:nvCxnSpPr>
+            <p:cNvPr id="45" name="Straight Connector 44"/>
+            <p:cNvCxnSpPr/>
+            <p:nvPr/>
+          </p:nvCxnSpPr>
+          <p:spPr>
+            <a:xfrm>
+              <a:off x="1340768" y="4572000"/>
+              <a:ext cx="504056" cy="0"/>
+            </a:xfrm>
+            <a:prstGeom prst="line">
+              <a:avLst/>
+            </a:prstGeom>
+          </p:spPr>
+          <p:style>
+            <a:lnRef idx="1">
+              <a:schemeClr val="accent1"/>
+            </a:lnRef>
+            <a:fillRef idx="0">
+              <a:schemeClr val="accent1"/>
+            </a:fillRef>
+            <a:effectRef idx="0">
+              <a:schemeClr val="accent1"/>
+            </a:effectRef>
+            <a:fontRef idx="minor">
+              <a:schemeClr val="tx1"/>
+            </a:fontRef>
+          </p:style>
+        </p:cxnSp>
+        <p:cxnSp>
+          <p:nvCxnSpPr>
+            <p:cNvPr id="47" name="Straight Connector 46"/>
+            <p:cNvCxnSpPr/>
+            <p:nvPr/>
+          </p:nvCxnSpPr>
+          <p:spPr>
+            <a:xfrm flipV="1">
+              <a:off x="1844824" y="4211960"/>
+              <a:ext cx="0" cy="360040"/>
+            </a:xfrm>
+            <a:prstGeom prst="line">
+              <a:avLst/>
+            </a:prstGeom>
+          </p:spPr>
+          <p:style>
+            <a:lnRef idx="1">
+              <a:schemeClr val="accent1"/>
+            </a:lnRef>
+            <a:fillRef idx="0">
+              <a:schemeClr val="accent1"/>
+            </a:fillRef>
+            <a:effectRef idx="0">
+              <a:schemeClr val="accent1"/>
+            </a:effectRef>
+            <a:fontRef idx="minor">
+              <a:schemeClr val="tx1"/>
+            </a:fontRef>
+          </p:style>
+        </p:cxnSp>
+        <p:cxnSp>
+          <p:nvCxnSpPr>
+            <p:cNvPr id="49" name="Straight Connector 48"/>
+            <p:cNvCxnSpPr/>
+            <p:nvPr/>
+          </p:nvCxnSpPr>
+          <p:spPr>
+            <a:xfrm>
+              <a:off x="1844824" y="4211960"/>
+              <a:ext cx="144016" cy="0"/>
+            </a:xfrm>
+            <a:prstGeom prst="line">
+              <a:avLst/>
+            </a:prstGeom>
+          </p:spPr>
+          <p:style>
+            <a:lnRef idx="1">
+              <a:schemeClr val="accent1"/>
+            </a:lnRef>
+            <a:fillRef idx="0">
+              <a:schemeClr val="accent1"/>
+            </a:fillRef>
+            <a:effectRef idx="0">
+              <a:schemeClr val="accent1"/>
+            </a:effectRef>
+            <a:fontRef idx="minor">
+              <a:schemeClr val="tx1"/>
+            </a:fontRef>
+          </p:style>
+        </p:cxnSp>
+        <p:cxnSp>
+          <p:nvCxnSpPr>
+            <p:cNvPr id="51" name="Straight Connector 50"/>
+            <p:cNvCxnSpPr/>
+            <p:nvPr/>
+          </p:nvCxnSpPr>
+          <p:spPr>
+            <a:xfrm>
+              <a:off x="1988840" y="4211960"/>
+              <a:ext cx="0" cy="360040"/>
+            </a:xfrm>
+            <a:prstGeom prst="line">
+              <a:avLst/>
+            </a:prstGeom>
+          </p:spPr>
+          <p:style>
+            <a:lnRef idx="1">
+              <a:schemeClr val="accent1"/>
+            </a:lnRef>
+            <a:fillRef idx="0">
+              <a:schemeClr val="accent1"/>
+            </a:fillRef>
+            <a:effectRef idx="0">
+              <a:schemeClr val="accent1"/>
+            </a:effectRef>
+            <a:fontRef idx="minor">
+              <a:schemeClr val="tx1"/>
+            </a:fontRef>
+          </p:style>
+        </p:cxnSp>
+        <p:cxnSp>
+          <p:nvCxnSpPr>
+            <p:cNvPr id="53" name="Straight Connector 52"/>
+            <p:cNvCxnSpPr/>
+            <p:nvPr/>
+          </p:nvCxnSpPr>
+          <p:spPr>
+            <a:xfrm>
+              <a:off x="1997224" y="4572000"/>
+              <a:ext cx="135632" cy="0"/>
+            </a:xfrm>
+            <a:prstGeom prst="line">
+              <a:avLst/>
+            </a:prstGeom>
+          </p:spPr>
+          <p:style>
+            <a:lnRef idx="1">
+              <a:schemeClr val="accent1"/>
+            </a:lnRef>
+            <a:fillRef idx="0">
+              <a:schemeClr val="accent1"/>
+            </a:fillRef>
+            <a:effectRef idx="0">
+              <a:schemeClr val="accent1"/>
+            </a:effectRef>
+            <a:fontRef idx="minor">
+              <a:schemeClr val="tx1"/>
+            </a:fontRef>
+          </p:style>
+        </p:cxnSp>
+        <p:cxnSp>
+          <p:nvCxnSpPr>
+            <p:cNvPr id="55" name="Straight Connector 54"/>
+            <p:cNvCxnSpPr/>
+            <p:nvPr/>
+          </p:nvCxnSpPr>
+          <p:spPr>
+            <a:xfrm flipV="1">
+              <a:off x="2132856" y="4355976"/>
+              <a:ext cx="0" cy="216024"/>
+            </a:xfrm>
+            <a:prstGeom prst="line">
+              <a:avLst/>
+            </a:prstGeom>
+          </p:spPr>
+          <p:style>
+            <a:lnRef idx="1">
+              <a:schemeClr val="accent1"/>
+            </a:lnRef>
+            <a:fillRef idx="0">
+              <a:schemeClr val="accent1"/>
+            </a:fillRef>
+            <a:effectRef idx="0">
+              <a:schemeClr val="accent1"/>
+            </a:effectRef>
+            <a:fontRef idx="minor">
+              <a:schemeClr val="tx1"/>
+            </a:fontRef>
+          </p:style>
+        </p:cxnSp>
+        <p:cxnSp>
+          <p:nvCxnSpPr>
+            <p:cNvPr id="57" name="Straight Connector 56"/>
+            <p:cNvCxnSpPr/>
+            <p:nvPr/>
+          </p:nvCxnSpPr>
+          <p:spPr>
+            <a:xfrm>
+              <a:off x="2132856" y="4355976"/>
+              <a:ext cx="288032" cy="0"/>
+            </a:xfrm>
+            <a:prstGeom prst="line">
+              <a:avLst/>
+            </a:prstGeom>
+          </p:spPr>
+          <p:style>
+            <a:lnRef idx="1">
+              <a:schemeClr val="accent1"/>
+            </a:lnRef>
+            <a:fillRef idx="0">
+              <a:schemeClr val="accent1"/>
+            </a:fillRef>
+            <a:effectRef idx="0">
+              <a:schemeClr val="accent1"/>
+            </a:effectRef>
+            <a:fontRef idx="minor">
+              <a:schemeClr val="tx1"/>
+            </a:fontRef>
+          </p:style>
+        </p:cxnSp>
+        <p:cxnSp>
+          <p:nvCxnSpPr>
+            <p:cNvPr id="59" name="Straight Connector 58"/>
+            <p:cNvCxnSpPr/>
+            <p:nvPr/>
+          </p:nvCxnSpPr>
+          <p:spPr>
+            <a:xfrm>
+              <a:off x="2420888" y="4355976"/>
+              <a:ext cx="0" cy="216024"/>
+            </a:xfrm>
+            <a:prstGeom prst="line">
+              <a:avLst/>
+            </a:prstGeom>
+          </p:spPr>
+          <p:style>
+            <a:lnRef idx="1">
+              <a:schemeClr val="accent1"/>
+            </a:lnRef>
+            <a:fillRef idx="0">
+              <a:schemeClr val="accent1"/>
+            </a:fillRef>
+            <a:effectRef idx="0">
+              <a:schemeClr val="accent1"/>
+            </a:effectRef>
+            <a:fontRef idx="minor">
+              <a:schemeClr val="tx1"/>
+            </a:fontRef>
+          </p:style>
+        </p:cxnSp>
+        <p:cxnSp>
+          <p:nvCxnSpPr>
+            <p:cNvPr id="61" name="Straight Connector 60"/>
+            <p:cNvCxnSpPr/>
+            <p:nvPr/>
+          </p:nvCxnSpPr>
+          <p:spPr>
+            <a:xfrm>
+              <a:off x="2420888" y="4572000"/>
+              <a:ext cx="432048" cy="0"/>
+            </a:xfrm>
+            <a:prstGeom prst="line">
+              <a:avLst/>
+            </a:prstGeom>
+          </p:spPr>
+          <p:style>
+            <a:lnRef idx="1">
+              <a:schemeClr val="accent1"/>
+            </a:lnRef>
+            <a:fillRef idx="0">
+              <a:schemeClr val="accent1"/>
+            </a:fillRef>
+            <a:effectRef idx="0">
+              <a:schemeClr val="accent1"/>
+            </a:effectRef>
+            <a:fontRef idx="minor">
+              <a:schemeClr val="tx1"/>
+            </a:fontRef>
+          </p:style>
+        </p:cxnSp>
+        <p:cxnSp>
+          <p:nvCxnSpPr>
+            <p:cNvPr id="63" name="Straight Connector 62"/>
+            <p:cNvCxnSpPr/>
+            <p:nvPr/>
+          </p:nvCxnSpPr>
+          <p:spPr>
+            <a:xfrm flipV="1">
+              <a:off x="2852936" y="4211960"/>
+              <a:ext cx="0" cy="360040"/>
+            </a:xfrm>
+            <a:prstGeom prst="line">
+              <a:avLst/>
+            </a:prstGeom>
+          </p:spPr>
+          <p:style>
+            <a:lnRef idx="1">
+              <a:schemeClr val="accent1"/>
+            </a:lnRef>
+            <a:fillRef idx="0">
+              <a:schemeClr val="accent1"/>
+            </a:fillRef>
+            <a:effectRef idx="0">
+              <a:schemeClr val="accent1"/>
+            </a:effectRef>
+            <a:fontRef idx="minor">
+              <a:schemeClr val="tx1"/>
+            </a:fontRef>
+          </p:style>
+        </p:cxnSp>
+        <p:cxnSp>
+          <p:nvCxnSpPr>
+            <p:cNvPr id="65" name="Straight Connector 64"/>
+            <p:cNvCxnSpPr/>
+            <p:nvPr/>
+          </p:nvCxnSpPr>
+          <p:spPr>
+            <a:xfrm>
+              <a:off x="2852936" y="4211960"/>
+              <a:ext cx="144016" cy="0"/>
+            </a:xfrm>
+            <a:prstGeom prst="line">
+              <a:avLst/>
+            </a:prstGeom>
+          </p:spPr>
+          <p:style>
+            <a:lnRef idx="1">
+              <a:schemeClr val="accent1"/>
+            </a:lnRef>
+            <a:fillRef idx="0">
+              <a:schemeClr val="accent1"/>
+            </a:fillRef>
+            <a:effectRef idx="0">
+              <a:schemeClr val="accent1"/>
+            </a:effectRef>
+            <a:fontRef idx="minor">
+              <a:schemeClr val="tx1"/>
+            </a:fontRef>
+          </p:style>
+        </p:cxnSp>
+        <p:cxnSp>
+          <p:nvCxnSpPr>
+            <p:cNvPr id="67" name="Straight Connector 66"/>
+            <p:cNvCxnSpPr/>
+            <p:nvPr/>
+          </p:nvCxnSpPr>
+          <p:spPr>
+            <a:xfrm>
+              <a:off x="2996952" y="4211960"/>
+              <a:ext cx="0" cy="360040"/>
+            </a:xfrm>
+            <a:prstGeom prst="line">
+              <a:avLst/>
+            </a:prstGeom>
+          </p:spPr>
+          <p:style>
+            <a:lnRef idx="1">
+              <a:schemeClr val="accent1"/>
+            </a:lnRef>
+            <a:fillRef idx="0">
+              <a:schemeClr val="accent1"/>
+            </a:fillRef>
+            <a:effectRef idx="0">
+              <a:schemeClr val="accent1"/>
+            </a:effectRef>
+            <a:fontRef idx="minor">
+              <a:schemeClr val="tx1"/>
+            </a:fontRef>
+          </p:style>
+        </p:cxnSp>
+        <p:cxnSp>
+          <p:nvCxnSpPr>
+            <p:cNvPr id="69" name="Straight Connector 68"/>
+            <p:cNvCxnSpPr/>
+            <p:nvPr/>
+          </p:nvCxnSpPr>
+          <p:spPr>
+            <a:xfrm>
+              <a:off x="2996952" y="4572000"/>
+              <a:ext cx="1152128" cy="0"/>
+            </a:xfrm>
+            <a:prstGeom prst="line">
+              <a:avLst/>
+            </a:prstGeom>
+          </p:spPr>
+          <p:style>
+            <a:lnRef idx="1">
+              <a:schemeClr val="accent1"/>
+            </a:lnRef>
+            <a:fillRef idx="0">
+              <a:schemeClr val="accent1"/>
+            </a:fillRef>
+            <a:effectRef idx="0">
+              <a:schemeClr val="accent1"/>
+            </a:effectRef>
+            <a:fontRef idx="minor">
+              <a:schemeClr val="tx1"/>
+            </a:fontRef>
+          </p:style>
+        </p:cxnSp>
+        <p:cxnSp>
+          <p:nvCxnSpPr>
+            <p:cNvPr id="71" name="Straight Connector 70"/>
+            <p:cNvCxnSpPr/>
+            <p:nvPr/>
+          </p:nvCxnSpPr>
+          <p:spPr>
+            <a:xfrm flipV="1">
+              <a:off x="4149080" y="4211960"/>
+              <a:ext cx="0" cy="360040"/>
+            </a:xfrm>
+            <a:prstGeom prst="line">
+              <a:avLst/>
+            </a:prstGeom>
+          </p:spPr>
+          <p:style>
+            <a:lnRef idx="1">
+              <a:schemeClr val="accent1"/>
+            </a:lnRef>
+            <a:fillRef idx="0">
+              <a:schemeClr val="accent1"/>
+            </a:fillRef>
+            <a:effectRef idx="0">
+              <a:schemeClr val="accent1"/>
+            </a:effectRef>
+            <a:fontRef idx="minor">
+              <a:schemeClr val="tx1"/>
+            </a:fontRef>
+          </p:style>
+        </p:cxnSp>
+        <p:cxnSp>
+          <p:nvCxnSpPr>
+            <p:cNvPr id="73" name="Straight Connector 72"/>
+            <p:cNvCxnSpPr/>
+            <p:nvPr/>
+          </p:nvCxnSpPr>
+          <p:spPr>
+            <a:xfrm>
+              <a:off x="4149080" y="4211960"/>
+              <a:ext cx="152400" cy="0"/>
+            </a:xfrm>
+            <a:prstGeom prst="line">
+              <a:avLst/>
+            </a:prstGeom>
+          </p:spPr>
+          <p:style>
+            <a:lnRef idx="1">
+              <a:schemeClr val="accent1"/>
+            </a:lnRef>
+            <a:fillRef idx="0">
+              <a:schemeClr val="accent1"/>
+            </a:fillRef>
+            <a:effectRef idx="0">
+              <a:schemeClr val="accent1"/>
+            </a:effectRef>
+            <a:fontRef idx="minor">
+              <a:schemeClr val="tx1"/>
+            </a:fontRef>
+          </p:style>
+        </p:cxnSp>
+        <p:cxnSp>
+          <p:nvCxnSpPr>
+            <p:cNvPr id="75" name="Straight Connector 74"/>
+            <p:cNvCxnSpPr/>
+            <p:nvPr/>
+          </p:nvCxnSpPr>
+          <p:spPr>
+            <a:xfrm>
+              <a:off x="4301480" y="4211960"/>
+              <a:ext cx="0" cy="360040"/>
+            </a:xfrm>
+            <a:prstGeom prst="line">
+              <a:avLst/>
+            </a:prstGeom>
+          </p:spPr>
+          <p:style>
+            <a:lnRef idx="1">
+              <a:schemeClr val="accent1"/>
+            </a:lnRef>
+            <a:fillRef idx="0">
+              <a:schemeClr val="accent1"/>
+            </a:fillRef>
+            <a:effectRef idx="0">
+              <a:schemeClr val="accent1"/>
+            </a:effectRef>
+            <a:fontRef idx="minor">
+              <a:schemeClr val="tx1"/>
+            </a:fontRef>
+          </p:style>
+        </p:cxnSp>
+        <p:cxnSp>
+          <p:nvCxnSpPr>
+            <p:cNvPr id="79" name="Straight Connector 78"/>
+            <p:cNvCxnSpPr/>
+            <p:nvPr/>
+          </p:nvCxnSpPr>
+          <p:spPr>
+            <a:xfrm>
+              <a:off x="4301480" y="4572000"/>
+              <a:ext cx="135632" cy="0"/>
+            </a:xfrm>
+            <a:prstGeom prst="line">
+              <a:avLst/>
+            </a:prstGeom>
+          </p:spPr>
+          <p:style>
+            <a:lnRef idx="1">
+              <a:schemeClr val="accent1"/>
+            </a:lnRef>
+            <a:fillRef idx="0">
+              <a:schemeClr val="accent1"/>
+            </a:fillRef>
+            <a:effectRef idx="0">
+              <a:schemeClr val="accent1"/>
+            </a:effectRef>
+            <a:fontRef idx="minor">
+              <a:schemeClr val="tx1"/>
+            </a:fontRef>
+          </p:style>
+        </p:cxnSp>
+        <p:cxnSp>
+          <p:nvCxnSpPr>
+            <p:cNvPr id="81" name="Straight Connector 80"/>
+            <p:cNvCxnSpPr/>
+            <p:nvPr/>
+          </p:nvCxnSpPr>
+          <p:spPr>
+            <a:xfrm flipV="1">
+              <a:off x="4437112" y="4355976"/>
+              <a:ext cx="0" cy="216024"/>
+            </a:xfrm>
+            <a:prstGeom prst="line">
+              <a:avLst/>
+            </a:prstGeom>
+          </p:spPr>
+          <p:style>
+            <a:lnRef idx="1">
+              <a:schemeClr val="accent1"/>
+            </a:lnRef>
+            <a:fillRef idx="0">
+              <a:schemeClr val="accent1"/>
+            </a:fillRef>
+            <a:effectRef idx="0">
+              <a:schemeClr val="accent1"/>
+            </a:effectRef>
+            <a:fontRef idx="minor">
+              <a:schemeClr val="tx1"/>
+            </a:fontRef>
+          </p:style>
+        </p:cxnSp>
+        <p:cxnSp>
+          <p:nvCxnSpPr>
+            <p:cNvPr id="83" name="Straight Connector 82"/>
+            <p:cNvCxnSpPr/>
+            <p:nvPr/>
+          </p:nvCxnSpPr>
+          <p:spPr>
+            <a:xfrm>
+              <a:off x="4437112" y="4355976"/>
+              <a:ext cx="288032" cy="0"/>
+            </a:xfrm>
+            <a:prstGeom prst="line">
+              <a:avLst/>
+            </a:prstGeom>
+          </p:spPr>
+          <p:style>
+            <a:lnRef idx="1">
+              <a:schemeClr val="accent1"/>
+            </a:lnRef>
+            <a:fillRef idx="0">
+              <a:schemeClr val="accent1"/>
+            </a:fillRef>
+            <a:effectRef idx="0">
+              <a:schemeClr val="accent1"/>
+            </a:effectRef>
+            <a:fontRef idx="minor">
+              <a:schemeClr val="tx1"/>
+            </a:fontRef>
+          </p:style>
+        </p:cxnSp>
+        <p:cxnSp>
+          <p:nvCxnSpPr>
+            <p:cNvPr id="85" name="Straight Connector 84"/>
+            <p:cNvCxnSpPr/>
+            <p:nvPr/>
+          </p:nvCxnSpPr>
+          <p:spPr>
+            <a:xfrm>
+              <a:off x="4725144" y="4355976"/>
+              <a:ext cx="0" cy="216024"/>
+            </a:xfrm>
+            <a:prstGeom prst="line">
+              <a:avLst/>
+            </a:prstGeom>
+          </p:spPr>
+          <p:style>
+            <a:lnRef idx="1">
+              <a:schemeClr val="accent1"/>
+            </a:lnRef>
+            <a:fillRef idx="0">
+              <a:schemeClr val="accent1"/>
+            </a:fillRef>
+            <a:effectRef idx="0">
+              <a:schemeClr val="accent1"/>
+            </a:effectRef>
+            <a:fontRef idx="minor">
+              <a:schemeClr val="tx1"/>
+            </a:fontRef>
+          </p:style>
+        </p:cxnSp>
+        <p:cxnSp>
+          <p:nvCxnSpPr>
+            <p:cNvPr id="87" name="Straight Connector 86"/>
+            <p:cNvCxnSpPr/>
+            <p:nvPr/>
+          </p:nvCxnSpPr>
+          <p:spPr>
+            <a:xfrm>
+              <a:off x="4725144" y="4572000"/>
+              <a:ext cx="864096" cy="0"/>
+            </a:xfrm>
+            <a:prstGeom prst="line">
+              <a:avLst/>
+            </a:prstGeom>
+          </p:spPr>
+          <p:style>
+            <a:lnRef idx="1">
+              <a:schemeClr val="accent1"/>
+            </a:lnRef>
+            <a:fillRef idx="0">
+              <a:schemeClr val="accent1"/>
+            </a:fillRef>
+            <a:effectRef idx="0">
+              <a:schemeClr val="accent1"/>
+            </a:effectRef>
+            <a:fontRef idx="minor">
+              <a:schemeClr val="tx1"/>
+            </a:fontRef>
+          </p:style>
+        </p:cxnSp>
+        <p:cxnSp>
+          <p:nvCxnSpPr>
+            <p:cNvPr id="89" name="Straight Arrow Connector 88"/>
+            <p:cNvCxnSpPr/>
+            <p:nvPr/>
+          </p:nvCxnSpPr>
+          <p:spPr>
+            <a:xfrm>
+              <a:off x="2132856" y="4077236"/>
+              <a:ext cx="2304256" cy="0"/>
+            </a:xfrm>
+            <a:prstGeom prst="straightConnector1">
+              <a:avLst/>
+            </a:prstGeom>
+            <a:ln>
+              <a:headEnd type="arrow"/>
+              <a:tailEnd type="arrow"/>
+            </a:ln>
+          </p:spPr>
+          <p:style>
+            <a:lnRef idx="1">
+              <a:schemeClr val="accent1"/>
+            </a:lnRef>
+            <a:fillRef idx="0">
+              <a:schemeClr val="accent1"/>
+            </a:fillRef>
+            <a:effectRef idx="0">
+              <a:schemeClr val="accent1"/>
+            </a:effectRef>
+            <a:fontRef idx="minor">
+              <a:schemeClr val="tx1"/>
+            </a:fontRef>
+          </p:style>
+        </p:cxnSp>
+        <p:cxnSp>
+          <p:nvCxnSpPr>
+            <p:cNvPr id="90" name="Straight Arrow Connector 89"/>
+            <p:cNvCxnSpPr/>
+            <p:nvPr/>
+          </p:nvCxnSpPr>
+          <p:spPr>
+            <a:xfrm>
+              <a:off x="2129234" y="4933752"/>
+              <a:ext cx="291654" cy="0"/>
+            </a:xfrm>
+            <a:prstGeom prst="straightConnector1">
+              <a:avLst/>
+            </a:prstGeom>
+            <a:ln>
+              <a:headEnd type="arrow" w="sm" len="sm"/>
+              <a:tailEnd type="arrow" w="sm" len="sm"/>
+            </a:ln>
+          </p:spPr>
+          <p:style>
+            <a:lnRef idx="1">
+              <a:schemeClr val="accent1"/>
+            </a:lnRef>
+            <a:fillRef idx="0">
+              <a:schemeClr val="accent1"/>
+            </a:fillRef>
+            <a:effectRef idx="0">
+              <a:schemeClr val="accent1"/>
+            </a:effectRef>
+            <a:fontRef idx="minor">
+              <a:schemeClr val="tx1"/>
+            </a:fontRef>
+          </p:style>
+        </p:cxnSp>
+        <p:cxnSp>
+          <p:nvCxnSpPr>
+            <p:cNvPr id="92" name="Straight Arrow Connector 91"/>
+            <p:cNvCxnSpPr/>
+            <p:nvPr/>
+          </p:nvCxnSpPr>
+          <p:spPr>
+            <a:xfrm>
+              <a:off x="2420888" y="4932040"/>
+              <a:ext cx="504056" cy="1712"/>
+            </a:xfrm>
+            <a:prstGeom prst="straightConnector1">
+              <a:avLst/>
+            </a:prstGeom>
+            <a:ln>
+              <a:headEnd type="arrow" w="sm" len="sm"/>
+              <a:tailEnd type="arrow" w="sm" len="sm"/>
+            </a:ln>
+          </p:spPr>
+          <p:style>
+            <a:lnRef idx="1">
+              <a:schemeClr val="accent1"/>
+            </a:lnRef>
+            <a:fillRef idx="0">
+              <a:schemeClr val="accent1"/>
+            </a:fillRef>
+            <a:effectRef idx="0">
+              <a:schemeClr val="accent1"/>
+            </a:effectRef>
+            <a:fontRef idx="minor">
+              <a:schemeClr val="tx1"/>
+            </a:fontRef>
+          </p:style>
+        </p:cxnSp>
+        <p:cxnSp>
+          <p:nvCxnSpPr>
+            <p:cNvPr id="94" name="Straight Arrow Connector 93"/>
+            <p:cNvCxnSpPr/>
+            <p:nvPr/>
+          </p:nvCxnSpPr>
+          <p:spPr>
+            <a:xfrm>
+              <a:off x="2924944" y="4932040"/>
+              <a:ext cx="1300336" cy="0"/>
+            </a:xfrm>
+            <a:prstGeom prst="straightConnector1">
+              <a:avLst/>
+            </a:prstGeom>
+            <a:ln>
+              <a:headEnd type="arrow" w="sm" len="sm"/>
+              <a:tailEnd type="arrow" w="sm" len="sm"/>
+            </a:ln>
+          </p:spPr>
+          <p:style>
+            <a:lnRef idx="1">
+              <a:schemeClr val="accent1"/>
+            </a:lnRef>
+            <a:fillRef idx="0">
+              <a:schemeClr val="accent1"/>
+            </a:fillRef>
+            <a:effectRef idx="0">
+              <a:schemeClr val="accent1"/>
+            </a:effectRef>
+            <a:fontRef idx="minor">
+              <a:schemeClr val="tx1"/>
+            </a:fontRef>
+          </p:style>
+        </p:cxnSp>
+        <p:cxnSp>
+          <p:nvCxnSpPr>
+            <p:cNvPr id="96" name="Straight Arrow Connector 95"/>
+            <p:cNvCxnSpPr/>
+            <p:nvPr/>
+          </p:nvCxnSpPr>
+          <p:spPr>
+            <a:xfrm>
+              <a:off x="4222055" y="4933752"/>
+              <a:ext cx="215057" cy="0"/>
+            </a:xfrm>
+            <a:prstGeom prst="straightConnector1">
+              <a:avLst/>
+            </a:prstGeom>
+            <a:ln>
+              <a:headEnd type="arrow" w="sm" len="sm"/>
+              <a:tailEnd type="arrow" w="sm" len="sm"/>
+            </a:ln>
+          </p:spPr>
+          <p:style>
+            <a:lnRef idx="1">
+              <a:schemeClr val="accent1"/>
+            </a:lnRef>
+            <a:fillRef idx="0">
+              <a:schemeClr val="accent1"/>
+            </a:fillRef>
+            <a:effectRef idx="0">
+              <a:schemeClr val="accent1"/>
+            </a:effectRef>
+            <a:fontRef idx="minor">
+              <a:schemeClr val="tx1"/>
+            </a:fontRef>
+          </p:style>
+        </p:cxnSp>
+        <p:sp>
+          <p:nvSpPr>
+            <p:cNvPr id="98" name="TextBox 97"/>
+            <p:cNvSpPr txBox="1"/>
+            <p:nvPr/>
+          </p:nvSpPr>
+          <p:spPr>
+            <a:xfrm>
+              <a:off x="3149352" y="3779912"/>
+              <a:ext cx="327334" cy="369332"/>
+            </a:xfrm>
+            <a:prstGeom prst="rect">
+              <a:avLst/>
+            </a:prstGeom>
+            <a:noFill/>
+          </p:spPr>
+          <p:txBody>
+            <a:bodyPr wrap="none" rtlCol="0">
+              <a:spAutoFit/>
+            </a:bodyPr>
+            <a:lstStyle/>
+            <a:p>
+              <a:r>
+                <a:rPr lang="en-GB" dirty="0" smtClean="0">
+                  <a:latin typeface="Symbol" panose="05050102010706020507" pitchFamily="18" charset="2"/>
+                </a:rPr>
+                <a:t>D</a:t>
+              </a:r>
+              <a:endParaRPr lang="en-GB" dirty="0">
+                <a:latin typeface="Symbol" panose="05050102010706020507" pitchFamily="18" charset="2"/>
+              </a:endParaRPr>
+            </a:p>
+          </p:txBody>
+        </p:sp>
+        <p:sp>
+          <p:nvSpPr>
+            <p:cNvPr id="99" name="TextBox 98"/>
+            <p:cNvSpPr txBox="1"/>
+            <p:nvPr/>
+          </p:nvSpPr>
+          <p:spPr>
+            <a:xfrm>
+              <a:off x="2138586" y="4624263"/>
+              <a:ext cx="272832" cy="307777"/>
+            </a:xfrm>
+            <a:prstGeom prst="rect">
+              <a:avLst/>
+            </a:prstGeom>
+            <a:noFill/>
+          </p:spPr>
+          <p:txBody>
+            <a:bodyPr wrap="none" rtlCol="0">
+              <a:spAutoFit/>
+            </a:bodyPr>
+            <a:lstStyle/>
+            <a:p>
+              <a:r>
+                <a:rPr lang="en-GB" sz="1400" dirty="0">
+                  <a:latin typeface="Symbol" panose="05050102010706020507" pitchFamily="18" charset="2"/>
+                </a:rPr>
+                <a:t>d</a:t>
+              </a:r>
+              <a:endParaRPr lang="en-GB" sz="1400" dirty="0">
+                <a:latin typeface="Symbol" panose="05050102010706020507" pitchFamily="18" charset="2"/>
+              </a:endParaRPr>
+            </a:p>
+          </p:txBody>
+        </p:sp>
+        <p:sp>
+          <p:nvSpPr>
+            <p:cNvPr id="100" name="TextBox 99"/>
+            <p:cNvSpPr txBox="1"/>
+            <p:nvPr/>
+          </p:nvSpPr>
+          <p:spPr>
+            <a:xfrm>
+              <a:off x="2492896" y="4624263"/>
+              <a:ext cx="322524" cy="307777"/>
+            </a:xfrm>
+            <a:prstGeom prst="rect">
+              <a:avLst/>
+            </a:prstGeom>
+            <a:noFill/>
+          </p:spPr>
+          <p:txBody>
+            <a:bodyPr wrap="none" rtlCol="0">
+              <a:spAutoFit/>
+            </a:bodyPr>
+            <a:lstStyle/>
+            <a:p>
+              <a:r>
+                <a:rPr lang="en-GB" sz="1400" dirty="0" smtClean="0">
+                  <a:latin typeface="Symbol" panose="05050102010706020507" pitchFamily="18" charset="2"/>
+                </a:rPr>
+                <a:t>t</a:t>
+              </a:r>
+              <a:r>
+                <a:rPr lang="en-GB" sz="1400" baseline="-25000" dirty="0" smtClean="0">
+                  <a:latin typeface="Symbol" panose="05050102010706020507" pitchFamily="18" charset="2"/>
+                </a:rPr>
+                <a:t>1</a:t>
+              </a:r>
+              <a:endParaRPr lang="en-GB" sz="1400" baseline="-25000" dirty="0">
+                <a:latin typeface="Symbol" panose="05050102010706020507" pitchFamily="18" charset="2"/>
+              </a:endParaRPr>
+            </a:p>
+          </p:txBody>
+        </p:sp>
+        <p:sp>
+          <p:nvSpPr>
+            <p:cNvPr id="101" name="TextBox 100"/>
+            <p:cNvSpPr txBox="1"/>
+            <p:nvPr/>
+          </p:nvSpPr>
+          <p:spPr>
+            <a:xfrm>
+              <a:off x="3393565" y="4624263"/>
+              <a:ext cx="322524" cy="307777"/>
+            </a:xfrm>
+            <a:prstGeom prst="rect">
+              <a:avLst/>
+            </a:prstGeom>
+            <a:noFill/>
+          </p:spPr>
+          <p:txBody>
+            <a:bodyPr wrap="none" rtlCol="0">
+              <a:spAutoFit/>
+            </a:bodyPr>
+            <a:lstStyle/>
+            <a:p>
+              <a:r>
+                <a:rPr lang="en-GB" sz="1400" dirty="0" smtClean="0">
+                  <a:latin typeface="Symbol" panose="05050102010706020507" pitchFamily="18" charset="2"/>
+                </a:rPr>
+                <a:t>t</a:t>
+              </a:r>
+              <a:r>
+                <a:rPr lang="en-GB" sz="1400" baseline="-25000" dirty="0">
+                  <a:latin typeface="Symbol" panose="05050102010706020507" pitchFamily="18" charset="2"/>
+                </a:rPr>
+                <a:t>2</a:t>
+              </a:r>
+              <a:endParaRPr lang="en-GB" sz="1400" baseline="-25000" dirty="0">
+                <a:latin typeface="Symbol" panose="05050102010706020507" pitchFamily="18" charset="2"/>
+              </a:endParaRPr>
+            </a:p>
+          </p:txBody>
+        </p:sp>
+        <p:sp>
+          <p:nvSpPr>
+            <p:cNvPr id="102" name="TextBox 101"/>
+            <p:cNvSpPr txBox="1"/>
+            <p:nvPr/>
+          </p:nvSpPr>
+          <p:spPr>
+            <a:xfrm>
+              <a:off x="4228926" y="4624263"/>
+              <a:ext cx="272832" cy="307777"/>
+            </a:xfrm>
+            <a:prstGeom prst="rect">
+              <a:avLst/>
+            </a:prstGeom>
+            <a:noFill/>
+          </p:spPr>
+          <p:txBody>
+            <a:bodyPr wrap="none" rtlCol="0">
+              <a:spAutoFit/>
+            </a:bodyPr>
+            <a:lstStyle/>
+            <a:p>
+              <a:r>
+                <a:rPr lang="en-GB" sz="1400" dirty="0" smtClean="0">
+                  <a:latin typeface="Symbol" panose="05050102010706020507" pitchFamily="18" charset="2"/>
+                </a:rPr>
+                <a:t>e</a:t>
+              </a:r>
+              <a:endParaRPr lang="en-GB" sz="1400" dirty="0">
+                <a:latin typeface="Symbol" panose="05050102010706020507" pitchFamily="18" charset="2"/>
+              </a:endParaRPr>
+            </a:p>
+          </p:txBody>
+        </p:sp>
+        <p:cxnSp>
+          <p:nvCxnSpPr>
+            <p:cNvPr id="103" name="Straight Arrow Connector 102"/>
+            <p:cNvCxnSpPr/>
+            <p:nvPr/>
+          </p:nvCxnSpPr>
+          <p:spPr>
+            <a:xfrm>
+              <a:off x="4434259" y="4933752"/>
+              <a:ext cx="291654" cy="0"/>
+            </a:xfrm>
+            <a:prstGeom prst="straightConnector1">
+              <a:avLst/>
+            </a:prstGeom>
+            <a:ln>
+              <a:headEnd type="arrow" w="sm" len="sm"/>
+              <a:tailEnd type="arrow" w="sm" len="sm"/>
+            </a:ln>
+          </p:spPr>
+          <p:style>
+            <a:lnRef idx="1">
+              <a:schemeClr val="accent1"/>
+            </a:lnRef>
+            <a:fillRef idx="0">
+              <a:schemeClr val="accent1"/>
+            </a:fillRef>
+            <a:effectRef idx="0">
+              <a:schemeClr val="accent1"/>
+            </a:effectRef>
+            <a:fontRef idx="minor">
+              <a:schemeClr val="tx1"/>
+            </a:fontRef>
+          </p:style>
+        </p:cxnSp>
+        <p:cxnSp>
+          <p:nvCxnSpPr>
+            <p:cNvPr id="104" name="Straight Arrow Connector 103"/>
+            <p:cNvCxnSpPr/>
+            <p:nvPr/>
+          </p:nvCxnSpPr>
+          <p:spPr>
+            <a:xfrm>
+              <a:off x="4725913" y="4932040"/>
+              <a:ext cx="504056" cy="1712"/>
+            </a:xfrm>
+            <a:prstGeom prst="straightConnector1">
+              <a:avLst/>
+            </a:prstGeom>
+            <a:ln>
+              <a:headEnd type="arrow" w="sm" len="sm"/>
+              <a:tailEnd type="arrow" w="sm" len="sm"/>
+            </a:ln>
+          </p:spPr>
+          <p:style>
+            <a:lnRef idx="1">
+              <a:schemeClr val="accent1"/>
+            </a:lnRef>
+            <a:fillRef idx="0">
+              <a:schemeClr val="accent1"/>
+            </a:fillRef>
+            <a:effectRef idx="0">
+              <a:schemeClr val="accent1"/>
+            </a:effectRef>
+            <a:fontRef idx="minor">
+              <a:schemeClr val="tx1"/>
+            </a:fontRef>
+          </p:style>
+        </p:cxnSp>
+        <p:cxnSp>
+          <p:nvCxnSpPr>
+            <p:cNvPr id="105" name="Straight Arrow Connector 104"/>
+            <p:cNvCxnSpPr/>
+            <p:nvPr/>
+          </p:nvCxnSpPr>
+          <p:spPr>
+            <a:xfrm>
+              <a:off x="1916832" y="4932040"/>
+              <a:ext cx="215057" cy="0"/>
+            </a:xfrm>
+            <a:prstGeom prst="straightConnector1">
+              <a:avLst/>
+            </a:prstGeom>
+            <a:ln>
+              <a:headEnd type="arrow" w="sm" len="sm"/>
+              <a:tailEnd type="arrow" w="sm" len="sm"/>
+            </a:ln>
+          </p:spPr>
+          <p:style>
+            <a:lnRef idx="1">
+              <a:schemeClr val="accent1"/>
+            </a:lnRef>
+            <a:fillRef idx="0">
+              <a:schemeClr val="accent1"/>
+            </a:fillRef>
+            <a:effectRef idx="0">
+              <a:schemeClr val="accent1"/>
+            </a:effectRef>
+            <a:fontRef idx="minor">
+              <a:schemeClr val="tx1"/>
+            </a:fontRef>
+          </p:style>
+        </p:cxnSp>
+        <p:sp>
+          <p:nvSpPr>
+            <p:cNvPr id="106" name="TextBox 105"/>
+            <p:cNvSpPr txBox="1"/>
+            <p:nvPr/>
+          </p:nvSpPr>
+          <p:spPr>
+            <a:xfrm>
+              <a:off x="1887944" y="4624263"/>
+              <a:ext cx="272832" cy="307777"/>
+            </a:xfrm>
+            <a:prstGeom prst="rect">
+              <a:avLst/>
+            </a:prstGeom>
+            <a:noFill/>
+          </p:spPr>
+          <p:txBody>
+            <a:bodyPr wrap="none" rtlCol="0">
+              <a:spAutoFit/>
+            </a:bodyPr>
+            <a:lstStyle/>
+            <a:p>
+              <a:r>
+                <a:rPr lang="en-GB" sz="1400" dirty="0" smtClean="0">
+                  <a:latin typeface="Symbol" panose="05050102010706020507" pitchFamily="18" charset="2"/>
+                </a:rPr>
+                <a:t>e</a:t>
+              </a:r>
+              <a:endParaRPr lang="en-GB" sz="1400" dirty="0">
+                <a:latin typeface="Symbol" panose="05050102010706020507" pitchFamily="18" charset="2"/>
+              </a:endParaRPr>
+            </a:p>
+          </p:txBody>
+        </p:sp>
+        <p:sp>
+          <p:nvSpPr>
+            <p:cNvPr id="107" name="TextBox 106"/>
+            <p:cNvSpPr txBox="1"/>
+            <p:nvPr/>
+          </p:nvSpPr>
+          <p:spPr>
+            <a:xfrm>
+              <a:off x="4437112" y="4624263"/>
+              <a:ext cx="272832" cy="307777"/>
+            </a:xfrm>
+            <a:prstGeom prst="rect">
+              <a:avLst/>
+            </a:prstGeom>
+            <a:noFill/>
+          </p:spPr>
+          <p:txBody>
+            <a:bodyPr wrap="none" rtlCol="0">
+              <a:spAutoFit/>
+            </a:bodyPr>
+            <a:lstStyle/>
+            <a:p>
+              <a:r>
+                <a:rPr lang="en-GB" sz="1400" dirty="0">
+                  <a:latin typeface="Symbol" panose="05050102010706020507" pitchFamily="18" charset="2"/>
+                </a:rPr>
+                <a:t>d</a:t>
+              </a:r>
+              <a:endParaRPr lang="en-GB" sz="1400" dirty="0">
+                <a:latin typeface="Symbol" panose="05050102010706020507" pitchFamily="18" charset="2"/>
+              </a:endParaRPr>
+            </a:p>
+          </p:txBody>
+        </p:sp>
+        <p:sp>
+          <p:nvSpPr>
+            <p:cNvPr id="108" name="TextBox 107"/>
+            <p:cNvSpPr txBox="1"/>
+            <p:nvPr/>
+          </p:nvSpPr>
+          <p:spPr>
+            <a:xfrm>
+              <a:off x="4791422" y="4624263"/>
+              <a:ext cx="322524" cy="307777"/>
+            </a:xfrm>
+            <a:prstGeom prst="rect">
+              <a:avLst/>
+            </a:prstGeom>
+            <a:noFill/>
+          </p:spPr>
+          <p:txBody>
+            <a:bodyPr wrap="none" rtlCol="0">
+              <a:spAutoFit/>
+            </a:bodyPr>
+            <a:lstStyle/>
+            <a:p>
+              <a:r>
+                <a:rPr lang="en-GB" sz="1400" dirty="0" smtClean="0">
+                  <a:latin typeface="Symbol" panose="05050102010706020507" pitchFamily="18" charset="2"/>
+                </a:rPr>
+                <a:t>t</a:t>
+              </a:r>
+              <a:r>
+                <a:rPr lang="en-GB" sz="1400" baseline="-25000" dirty="0" smtClean="0">
+                  <a:latin typeface="Symbol" panose="05050102010706020507" pitchFamily="18" charset="2"/>
+                </a:rPr>
+                <a:t>1</a:t>
+              </a:r>
+              <a:endParaRPr lang="en-GB" sz="1400" baseline="-25000" dirty="0">
+                <a:latin typeface="Symbol" panose="05050102010706020507" pitchFamily="18" charset="2"/>
+              </a:endParaRPr>
+            </a:p>
+          </p:txBody>
+        </p:sp>
+        <p:cxnSp>
+          <p:nvCxnSpPr>
+            <p:cNvPr id="109" name="Straight Arrow Connector 108"/>
+            <p:cNvCxnSpPr/>
+            <p:nvPr/>
+          </p:nvCxnSpPr>
+          <p:spPr>
+            <a:xfrm>
+              <a:off x="5229969" y="4941750"/>
+              <a:ext cx="504056" cy="1712"/>
+            </a:xfrm>
+            <a:prstGeom prst="straightConnector1">
+              <a:avLst/>
+            </a:prstGeom>
+            <a:ln>
+              <a:headEnd type="arrow" w="sm" len="sm"/>
+              <a:tailEnd type="arrow" w="sm" len="sm"/>
+            </a:ln>
+          </p:spPr>
+          <p:style>
+            <a:lnRef idx="1">
+              <a:schemeClr val="accent1"/>
+            </a:lnRef>
+            <a:fillRef idx="0">
+              <a:schemeClr val="accent1"/>
+            </a:fillRef>
+            <a:effectRef idx="0">
+              <a:schemeClr val="accent1"/>
+            </a:effectRef>
+            <a:fontRef idx="minor">
+              <a:schemeClr val="tx1"/>
+            </a:fontRef>
+          </p:style>
+        </p:cxnSp>
+        <p:sp>
+          <p:nvSpPr>
+            <p:cNvPr id="110" name="TextBox 109"/>
+            <p:cNvSpPr txBox="1"/>
+            <p:nvPr/>
+          </p:nvSpPr>
+          <p:spPr>
+            <a:xfrm>
+              <a:off x="5247654" y="4624263"/>
+              <a:ext cx="727315" cy="307777"/>
+            </a:xfrm>
+            <a:prstGeom prst="rect">
+              <a:avLst/>
+            </a:prstGeom>
+            <a:noFill/>
+          </p:spPr>
+          <p:txBody>
+            <a:bodyPr wrap="none" rtlCol="0">
+              <a:spAutoFit/>
+            </a:bodyPr>
+            <a:lstStyle/>
+            <a:p>
+              <a:r>
+                <a:rPr lang="en-GB" sz="1400" dirty="0" smtClean="0"/>
+                <a:t>acquire</a:t>
+              </a:r>
+              <a:endParaRPr lang="en-GB" sz="1400" dirty="0"/>
+            </a:p>
+          </p:txBody>
+        </p:sp>
+        <p:grpSp>
+          <p:nvGrpSpPr>
+            <p:cNvPr id="111" name="Group 110"/>
+            <p:cNvGrpSpPr/>
+            <p:nvPr/>
+          </p:nvGrpSpPr>
+          <p:grpSpPr>
+            <a:xfrm>
+              <a:off x="836712" y="6002280"/>
+              <a:ext cx="4968552" cy="729956"/>
+              <a:chOff x="-71228" y="4566076"/>
+              <a:chExt cx="6110518" cy="437974"/>
+            </a:xfrm>
+          </p:grpSpPr>
+          <p:cxnSp>
+            <p:nvCxnSpPr>
+              <p:cNvPr id="112" name="Straight Connector 111"/>
+              <p:cNvCxnSpPr/>
+              <p:nvPr/>
+            </p:nvCxnSpPr>
+            <p:spPr>
+              <a:xfrm>
+                <a:off x="-71228" y="4566076"/>
+                <a:ext cx="6110518" cy="5924"/>
+              </a:xfrm>
+              <a:prstGeom prst="line">
+                <a:avLst/>
+              </a:prstGeom>
+              <a:ln w="3175"/>
+            </p:spPr>
+            <p:style>
+              <a:lnRef idx="1">
+                <a:schemeClr val="accent1"/>
+              </a:lnRef>
+              <a:fillRef idx="0">
+                <a:schemeClr val="accent1"/>
+              </a:fillRef>
+              <a:effectRef idx="0">
+                <a:schemeClr val="accent1"/>
+              </a:effectRef>
+              <a:fontRef idx="minor">
+                <a:schemeClr val="tx1"/>
+              </a:fontRef>
+            </p:style>
+          </p:cxnSp>
+          <p:cxnSp>
+            <p:nvCxnSpPr>
+              <p:cNvPr id="113" name="Straight Connector 112"/>
+              <p:cNvCxnSpPr/>
+              <p:nvPr/>
+            </p:nvCxnSpPr>
+            <p:spPr>
+              <a:xfrm>
+                <a:off x="-71228" y="4788024"/>
+                <a:ext cx="6110518" cy="0"/>
+              </a:xfrm>
+              <a:prstGeom prst="line">
+                <a:avLst/>
+              </a:prstGeom>
+              <a:ln w="3175"/>
+            </p:spPr>
+            <p:style>
+              <a:lnRef idx="1">
+                <a:schemeClr val="accent1"/>
+              </a:lnRef>
+              <a:fillRef idx="0">
+                <a:schemeClr val="accent1"/>
+              </a:fillRef>
+              <a:effectRef idx="0">
+                <a:schemeClr val="accent1"/>
+              </a:effectRef>
+              <a:fontRef idx="minor">
+                <a:schemeClr val="tx1"/>
+              </a:fontRef>
+            </p:style>
+          </p:cxnSp>
+          <p:cxnSp>
+            <p:nvCxnSpPr>
+              <p:cNvPr id="114" name="Straight Connector 113"/>
+              <p:cNvCxnSpPr/>
+              <p:nvPr/>
+            </p:nvCxnSpPr>
+            <p:spPr>
+              <a:xfrm flipV="1">
+                <a:off x="-71228" y="5004048"/>
+                <a:ext cx="5660227" cy="2"/>
+              </a:xfrm>
+              <a:prstGeom prst="line">
+                <a:avLst/>
+              </a:prstGeom>
+              <a:ln w="3175"/>
+            </p:spPr>
+            <p:style>
+              <a:lnRef idx="1">
+                <a:schemeClr val="accent1"/>
+              </a:lnRef>
+              <a:fillRef idx="0">
+                <a:schemeClr val="accent1"/>
+              </a:fillRef>
+              <a:effectRef idx="0">
+                <a:schemeClr val="accent1"/>
+              </a:effectRef>
+              <a:fontRef idx="minor">
+                <a:schemeClr val="tx1"/>
+              </a:fontRef>
+            </p:style>
+          </p:cxnSp>
+          <p:cxnSp>
+            <p:nvCxnSpPr>
+              <p:cNvPr id="115" name="Straight Connector 114"/>
+              <p:cNvCxnSpPr/>
+              <p:nvPr/>
+            </p:nvCxnSpPr>
+            <p:spPr>
+              <a:xfrm>
+                <a:off x="548680" y="4788024"/>
+                <a:ext cx="720080" cy="0"/>
+              </a:xfrm>
+              <a:prstGeom prst="line">
+                <a:avLst/>
+              </a:prstGeom>
+            </p:spPr>
+            <p:style>
+              <a:lnRef idx="1">
+                <a:schemeClr val="accent2"/>
+              </a:lnRef>
+              <a:fillRef idx="0">
+                <a:schemeClr val="accent2"/>
+              </a:fillRef>
+              <a:effectRef idx="0">
+                <a:schemeClr val="accent2"/>
+              </a:effectRef>
+              <a:fontRef idx="minor">
+                <a:schemeClr val="tx1"/>
+              </a:fontRef>
+            </p:style>
+          </p:cxnSp>
+          <p:cxnSp>
+            <p:nvCxnSpPr>
+              <p:cNvPr id="116" name="Straight Connector 115"/>
+              <p:cNvCxnSpPr/>
+              <p:nvPr/>
+            </p:nvCxnSpPr>
+            <p:spPr>
+              <a:xfrm flipV="1">
+                <a:off x="1268760" y="4572000"/>
+                <a:ext cx="144016" cy="216024"/>
+              </a:xfrm>
+              <a:prstGeom prst="line">
+                <a:avLst/>
+              </a:prstGeom>
+            </p:spPr>
+            <p:style>
+              <a:lnRef idx="1">
+                <a:schemeClr val="accent2"/>
+              </a:lnRef>
+              <a:fillRef idx="0">
+                <a:schemeClr val="accent2"/>
+              </a:fillRef>
+              <a:effectRef idx="0">
+                <a:schemeClr val="accent2"/>
+              </a:effectRef>
+              <a:fontRef idx="minor">
+                <a:schemeClr val="tx1"/>
+              </a:fontRef>
+            </p:style>
+          </p:cxnSp>
+          <p:cxnSp>
+            <p:nvCxnSpPr>
+              <p:cNvPr id="117" name="Straight Connector 116"/>
+              <p:cNvCxnSpPr/>
+              <p:nvPr/>
+            </p:nvCxnSpPr>
+            <p:spPr>
+              <a:xfrm>
+                <a:off x="1412776" y="4572000"/>
+                <a:ext cx="1062118" cy="0"/>
+              </a:xfrm>
+              <a:prstGeom prst="line">
+                <a:avLst/>
+              </a:prstGeom>
+            </p:spPr>
+            <p:style>
+              <a:lnRef idx="1">
+                <a:schemeClr val="accent2"/>
+              </a:lnRef>
+              <a:fillRef idx="0">
+                <a:schemeClr val="accent2"/>
+              </a:fillRef>
+              <a:effectRef idx="0">
+                <a:schemeClr val="accent2"/>
+              </a:effectRef>
+              <a:fontRef idx="minor">
+                <a:schemeClr val="tx1"/>
+              </a:fontRef>
+            </p:style>
+          </p:cxnSp>
+          <p:cxnSp>
+            <p:nvCxnSpPr>
+              <p:cNvPr id="118" name="Straight Connector 117"/>
+              <p:cNvCxnSpPr/>
+              <p:nvPr/>
+            </p:nvCxnSpPr>
+            <p:spPr>
+              <a:xfrm>
+                <a:off x="2474894" y="4572000"/>
+                <a:ext cx="144016" cy="216024"/>
+              </a:xfrm>
+              <a:prstGeom prst="line">
+                <a:avLst/>
+              </a:prstGeom>
+            </p:spPr>
+            <p:style>
+              <a:lnRef idx="1">
+                <a:schemeClr val="accent2"/>
+              </a:lnRef>
+              <a:fillRef idx="0">
+                <a:schemeClr val="accent2"/>
+              </a:fillRef>
+              <a:effectRef idx="0">
+                <a:schemeClr val="accent2"/>
+              </a:effectRef>
+              <a:fontRef idx="minor">
+                <a:schemeClr val="tx1"/>
+              </a:fontRef>
+            </p:style>
+          </p:cxnSp>
+          <p:cxnSp>
+            <p:nvCxnSpPr>
+              <p:cNvPr id="119" name="Straight Connector 118"/>
+              <p:cNvCxnSpPr/>
+              <p:nvPr/>
+            </p:nvCxnSpPr>
+            <p:spPr>
+              <a:xfrm>
+                <a:off x="2618910" y="4788024"/>
+                <a:ext cx="1440160" cy="0"/>
+              </a:xfrm>
+              <a:prstGeom prst="line">
+                <a:avLst/>
+              </a:prstGeom>
+            </p:spPr>
+            <p:style>
+              <a:lnRef idx="1">
+                <a:schemeClr val="accent2"/>
+              </a:lnRef>
+              <a:fillRef idx="0">
+                <a:schemeClr val="accent2"/>
+              </a:fillRef>
+              <a:effectRef idx="0">
+                <a:schemeClr val="accent2"/>
+              </a:effectRef>
+              <a:fontRef idx="minor">
+                <a:schemeClr val="tx1"/>
+              </a:fontRef>
+            </p:style>
+          </p:cxnSp>
+          <p:cxnSp>
+            <p:nvCxnSpPr>
+              <p:cNvPr id="120" name="Straight Connector 119"/>
+              <p:cNvCxnSpPr/>
+              <p:nvPr/>
+            </p:nvCxnSpPr>
+            <p:spPr>
+              <a:xfrm>
+                <a:off x="4059070" y="4788024"/>
+                <a:ext cx="144016" cy="216024"/>
+              </a:xfrm>
+              <a:prstGeom prst="line">
+                <a:avLst/>
+              </a:prstGeom>
+            </p:spPr>
+            <p:style>
+              <a:lnRef idx="1">
+                <a:schemeClr val="accent2"/>
+              </a:lnRef>
+              <a:fillRef idx="0">
+                <a:schemeClr val="accent2"/>
+              </a:fillRef>
+              <a:effectRef idx="0">
+                <a:schemeClr val="accent2"/>
+              </a:effectRef>
+              <a:fontRef idx="minor">
+                <a:schemeClr val="tx1"/>
+              </a:fontRef>
+            </p:style>
+          </p:cxnSp>
+          <p:cxnSp>
+            <p:nvCxnSpPr>
+              <p:cNvPr id="121" name="Straight Connector 120"/>
+              <p:cNvCxnSpPr/>
+              <p:nvPr/>
+            </p:nvCxnSpPr>
+            <p:spPr>
+              <a:xfrm>
+                <a:off x="4199520" y="5004048"/>
+                <a:ext cx="1839770" cy="0"/>
+              </a:xfrm>
+              <a:prstGeom prst="line">
+                <a:avLst/>
+              </a:prstGeom>
+            </p:spPr>
+            <p:style>
+              <a:lnRef idx="1">
+                <a:schemeClr val="accent2"/>
+              </a:lnRef>
+              <a:fillRef idx="0">
+                <a:schemeClr val="accent2"/>
+              </a:fillRef>
+              <a:effectRef idx="0">
+                <a:schemeClr val="accent2"/>
+              </a:effectRef>
+              <a:fontRef idx="minor">
+                <a:schemeClr val="tx1"/>
+              </a:fontRef>
+            </p:style>
+          </p:cxnSp>
+        </p:grpSp>
+        <p:cxnSp>
+          <p:nvCxnSpPr>
+            <p:cNvPr id="129" name="Straight Arrow Connector 128"/>
+            <p:cNvCxnSpPr/>
+            <p:nvPr/>
+          </p:nvCxnSpPr>
+          <p:spPr>
+            <a:xfrm>
+              <a:off x="1340768" y="4932040"/>
+              <a:ext cx="576064" cy="1712"/>
+            </a:xfrm>
+            <a:prstGeom prst="straightConnector1">
+              <a:avLst/>
+            </a:prstGeom>
+            <a:ln>
+              <a:headEnd type="arrow" w="sm" len="sm"/>
+              <a:tailEnd type="arrow" w="sm" len="sm"/>
+            </a:ln>
+          </p:spPr>
+          <p:style>
+            <a:lnRef idx="1">
+              <a:schemeClr val="accent1"/>
+            </a:lnRef>
+            <a:fillRef idx="0">
+              <a:schemeClr val="accent1"/>
+            </a:fillRef>
+            <a:effectRef idx="0">
+              <a:schemeClr val="accent1"/>
+            </a:effectRef>
+            <a:fontRef idx="minor">
+              <a:schemeClr val="tx1"/>
+            </a:fontRef>
+          </p:style>
+        </p:cxnSp>
+        <p:sp>
+          <p:nvSpPr>
+            <p:cNvPr id="131" name="TextBox 130"/>
+            <p:cNvSpPr txBox="1"/>
+            <p:nvPr/>
+          </p:nvSpPr>
+          <p:spPr>
+            <a:xfrm>
+              <a:off x="1052736" y="5132751"/>
+              <a:ext cx="279244" cy="307777"/>
+            </a:xfrm>
+            <a:prstGeom prst="rect">
+              <a:avLst/>
+            </a:prstGeom>
+            <a:noFill/>
+          </p:spPr>
+          <p:txBody>
+            <a:bodyPr wrap="none" rtlCol="0">
+              <a:spAutoFit/>
+            </a:bodyPr>
+            <a:lstStyle/>
+            <a:p>
+              <a:r>
+                <a:rPr lang="en-GB" sz="1400" dirty="0" smtClean="0"/>
+                <a:t>p</a:t>
+              </a:r>
+              <a:endParaRPr lang="en-GB" sz="1400" dirty="0"/>
+            </a:p>
+          </p:txBody>
+        </p:sp>
+        <p:sp>
+          <p:nvSpPr>
+            <p:cNvPr id="132" name="TextBox 131"/>
+            <p:cNvSpPr txBox="1"/>
+            <p:nvPr/>
+          </p:nvSpPr>
+          <p:spPr>
+            <a:xfrm>
+              <a:off x="1549965" y="5132751"/>
+              <a:ext cx="276038" cy="307777"/>
+            </a:xfrm>
+            <a:prstGeom prst="rect">
+              <a:avLst/>
+            </a:prstGeom>
+            <a:noFill/>
+          </p:spPr>
+          <p:txBody>
+            <a:bodyPr wrap="none" rtlCol="0">
+              <a:spAutoFit/>
+            </a:bodyPr>
+            <a:lstStyle/>
+            <a:p>
+              <a:r>
+                <a:rPr lang="en-GB" sz="1400" dirty="0" smtClean="0"/>
+                <a:t>0</a:t>
+              </a:r>
+              <a:endParaRPr lang="en-GB" sz="1400" dirty="0"/>
+            </a:p>
+          </p:txBody>
+        </p:sp>
+        <p:sp>
+          <p:nvSpPr>
+            <p:cNvPr id="133" name="TextBox 132"/>
+            <p:cNvSpPr txBox="1"/>
+            <p:nvPr/>
+          </p:nvSpPr>
+          <p:spPr>
+            <a:xfrm>
+              <a:off x="1886341" y="5132751"/>
+              <a:ext cx="276038" cy="307777"/>
+            </a:xfrm>
+            <a:prstGeom prst="rect">
+              <a:avLst/>
+            </a:prstGeom>
+            <a:noFill/>
+          </p:spPr>
+          <p:txBody>
+            <a:bodyPr wrap="none" rtlCol="0">
+              <a:spAutoFit/>
+            </a:bodyPr>
+            <a:lstStyle/>
+            <a:p>
+              <a:r>
+                <a:rPr lang="en-GB" sz="1400" dirty="0" smtClean="0"/>
+                <a:t>1</a:t>
+              </a:r>
+              <a:endParaRPr lang="en-GB" sz="1400" dirty="0"/>
+            </a:p>
+          </p:txBody>
+        </p:sp>
+        <p:sp>
+          <p:nvSpPr>
+            <p:cNvPr id="134" name="TextBox 133"/>
+            <p:cNvSpPr txBox="1"/>
+            <p:nvPr/>
+          </p:nvSpPr>
+          <p:spPr>
+            <a:xfrm>
+              <a:off x="2131889" y="5132751"/>
+              <a:ext cx="276038" cy="307777"/>
+            </a:xfrm>
+            <a:prstGeom prst="rect">
+              <a:avLst/>
+            </a:prstGeom>
+            <a:noFill/>
+          </p:spPr>
+          <p:txBody>
+            <a:bodyPr wrap="none" rtlCol="0">
+              <a:spAutoFit/>
+            </a:bodyPr>
+            <a:lstStyle/>
+            <a:p>
+              <a:r>
+                <a:rPr lang="en-GB" sz="1400" dirty="0" smtClean="0"/>
+                <a:t>1</a:t>
+              </a:r>
+              <a:endParaRPr lang="en-GB" sz="1400" dirty="0"/>
+            </a:p>
+          </p:txBody>
+        </p:sp>
+        <p:sp>
+          <p:nvSpPr>
+            <p:cNvPr id="135" name="TextBox 134"/>
+            <p:cNvSpPr txBox="1"/>
+            <p:nvPr/>
+          </p:nvSpPr>
+          <p:spPr>
+            <a:xfrm>
+              <a:off x="2516139" y="5132751"/>
+              <a:ext cx="276038" cy="307777"/>
+            </a:xfrm>
+            <a:prstGeom prst="rect">
+              <a:avLst/>
+            </a:prstGeom>
+            <a:noFill/>
+          </p:spPr>
+          <p:txBody>
+            <a:bodyPr wrap="none" rtlCol="0">
+              <a:spAutoFit/>
+            </a:bodyPr>
+            <a:lstStyle/>
+            <a:p>
+              <a:r>
+                <a:rPr lang="en-GB" sz="1400" dirty="0" smtClean="0"/>
+                <a:t>1</a:t>
+              </a:r>
+              <a:endParaRPr lang="en-GB" sz="1400" dirty="0"/>
+            </a:p>
+          </p:txBody>
+        </p:sp>
+        <p:sp>
+          <p:nvSpPr>
+            <p:cNvPr id="136" name="TextBox 135"/>
+            <p:cNvSpPr txBox="1"/>
+            <p:nvPr/>
+          </p:nvSpPr>
+          <p:spPr>
+            <a:xfrm>
+              <a:off x="3416808" y="5132751"/>
+              <a:ext cx="276038" cy="307777"/>
+            </a:xfrm>
+            <a:prstGeom prst="rect">
+              <a:avLst/>
+            </a:prstGeom>
+            <a:noFill/>
+          </p:spPr>
+          <p:txBody>
+            <a:bodyPr wrap="none" rtlCol="0">
+              <a:spAutoFit/>
+            </a:bodyPr>
+            <a:lstStyle/>
+            <a:p>
+              <a:r>
+                <a:rPr lang="en-GB" sz="1400" dirty="0" smtClean="0"/>
+                <a:t>0</a:t>
+              </a:r>
+              <a:endParaRPr lang="en-GB" sz="1400" dirty="0"/>
+            </a:p>
+          </p:txBody>
+        </p:sp>
+        <p:sp>
+          <p:nvSpPr>
+            <p:cNvPr id="137" name="TextBox 136"/>
+            <p:cNvSpPr txBox="1"/>
+            <p:nvPr/>
+          </p:nvSpPr>
+          <p:spPr>
+            <a:xfrm>
+              <a:off x="4164313" y="5132751"/>
+              <a:ext cx="330540" cy="307777"/>
+            </a:xfrm>
+            <a:prstGeom prst="rect">
+              <a:avLst/>
+            </a:prstGeom>
+            <a:noFill/>
+          </p:spPr>
+          <p:txBody>
+            <a:bodyPr wrap="none" rtlCol="0">
+              <a:spAutoFit/>
+            </a:bodyPr>
+            <a:lstStyle/>
+            <a:p>
+              <a:r>
+                <a:rPr lang="en-GB" sz="1400" dirty="0" smtClean="0"/>
+                <a:t>-1</a:t>
+              </a:r>
+              <a:endParaRPr lang="en-GB" sz="1400" dirty="0"/>
+            </a:p>
+          </p:txBody>
+        </p:sp>
+        <p:sp>
+          <p:nvSpPr>
+            <p:cNvPr id="138" name="TextBox 137"/>
+            <p:cNvSpPr txBox="1"/>
+            <p:nvPr/>
+          </p:nvSpPr>
+          <p:spPr>
+            <a:xfrm>
+              <a:off x="4414552" y="5132751"/>
+              <a:ext cx="330540" cy="307777"/>
+            </a:xfrm>
+            <a:prstGeom prst="rect">
+              <a:avLst/>
+            </a:prstGeom>
+            <a:noFill/>
+          </p:spPr>
+          <p:txBody>
+            <a:bodyPr wrap="none" rtlCol="0">
+              <a:spAutoFit/>
+            </a:bodyPr>
+            <a:lstStyle/>
+            <a:p>
+              <a:r>
+                <a:rPr lang="en-GB" sz="1400" dirty="0" smtClean="0"/>
+                <a:t>-1</a:t>
+              </a:r>
+              <a:endParaRPr lang="en-GB" sz="1400" dirty="0"/>
+            </a:p>
+          </p:txBody>
+        </p:sp>
+        <p:sp>
+          <p:nvSpPr>
+            <p:cNvPr id="139" name="TextBox 138"/>
+            <p:cNvSpPr txBox="1"/>
+            <p:nvPr/>
+          </p:nvSpPr>
+          <p:spPr>
+            <a:xfrm>
+              <a:off x="4783406" y="5132751"/>
+              <a:ext cx="330540" cy="307777"/>
+            </a:xfrm>
+            <a:prstGeom prst="rect">
+              <a:avLst/>
+            </a:prstGeom>
+            <a:noFill/>
+          </p:spPr>
+          <p:txBody>
+            <a:bodyPr wrap="none" rtlCol="0">
+              <a:spAutoFit/>
+            </a:bodyPr>
+            <a:lstStyle/>
+            <a:p>
+              <a:r>
+                <a:rPr lang="en-GB" sz="1400" dirty="0" smtClean="0"/>
+                <a:t>-1</a:t>
+              </a:r>
+              <a:endParaRPr lang="en-GB" sz="1400" dirty="0"/>
+            </a:p>
+          </p:txBody>
+        </p:sp>
+        <p:sp>
+          <p:nvSpPr>
+            <p:cNvPr id="140" name="TextBox 139"/>
+            <p:cNvSpPr txBox="1"/>
+            <p:nvPr/>
+          </p:nvSpPr>
+          <p:spPr>
+            <a:xfrm>
+              <a:off x="5316727" y="5132751"/>
+              <a:ext cx="330540" cy="307777"/>
+            </a:xfrm>
+            <a:prstGeom prst="rect">
+              <a:avLst/>
+            </a:prstGeom>
+            <a:noFill/>
+          </p:spPr>
+          <p:txBody>
+            <a:bodyPr wrap="none" rtlCol="0">
+              <a:spAutoFit/>
+            </a:bodyPr>
+            <a:lstStyle/>
+            <a:p>
+              <a:r>
+                <a:rPr lang="en-GB" sz="1400" dirty="0" smtClean="0"/>
+                <a:t>-1</a:t>
+              </a:r>
+              <a:endParaRPr lang="en-GB" sz="1400" dirty="0"/>
+            </a:p>
+          </p:txBody>
+        </p:sp>
+        <p:sp>
+          <p:nvSpPr>
+            <p:cNvPr id="141" name="TextBox 140"/>
+            <p:cNvSpPr txBox="1"/>
+            <p:nvPr/>
+          </p:nvSpPr>
+          <p:spPr>
+            <a:xfrm>
+              <a:off x="1052736" y="5416351"/>
+              <a:ext cx="279244" cy="307777"/>
+            </a:xfrm>
+            <a:prstGeom prst="rect">
+              <a:avLst/>
+            </a:prstGeom>
+            <a:noFill/>
+          </p:spPr>
+          <p:txBody>
+            <a:bodyPr wrap="none" rtlCol="0">
+              <a:spAutoFit/>
+            </a:bodyPr>
+            <a:lstStyle/>
+            <a:p>
+              <a:r>
+                <a:rPr lang="en-GB" sz="1400" dirty="0" smtClean="0"/>
+                <a:t>g</a:t>
+              </a:r>
+              <a:endParaRPr lang="en-GB" sz="1400" dirty="0"/>
+            </a:p>
+          </p:txBody>
+        </p:sp>
+        <p:sp>
+          <p:nvSpPr>
+            <p:cNvPr id="142" name="TextBox 141"/>
+            <p:cNvSpPr txBox="1"/>
+            <p:nvPr/>
+          </p:nvSpPr>
+          <p:spPr>
+            <a:xfrm>
+              <a:off x="1549965" y="5416351"/>
+              <a:ext cx="276038" cy="307777"/>
+            </a:xfrm>
+            <a:prstGeom prst="rect">
+              <a:avLst/>
+            </a:prstGeom>
+            <a:noFill/>
+          </p:spPr>
+          <p:txBody>
+            <a:bodyPr wrap="none" rtlCol="0">
+              <a:spAutoFit/>
+            </a:bodyPr>
+            <a:lstStyle/>
+            <a:p>
+              <a:r>
+                <a:rPr lang="en-GB" sz="1400" dirty="0" smtClean="0"/>
+                <a:t>0</a:t>
+              </a:r>
+              <a:endParaRPr lang="en-GB" sz="1400" dirty="0"/>
+            </a:p>
+          </p:txBody>
+        </p:sp>
+        <p:sp>
+          <p:nvSpPr>
+            <p:cNvPr id="143" name="TextBox 142"/>
+            <p:cNvSpPr txBox="1"/>
+            <p:nvPr/>
+          </p:nvSpPr>
+          <p:spPr>
+            <a:xfrm>
+              <a:off x="1886341" y="5416351"/>
+              <a:ext cx="276038" cy="307777"/>
+            </a:xfrm>
+            <a:prstGeom prst="rect">
+              <a:avLst/>
+            </a:prstGeom>
+            <a:noFill/>
+          </p:spPr>
+          <p:txBody>
+            <a:bodyPr wrap="none" rtlCol="0">
+              <a:spAutoFit/>
+            </a:bodyPr>
+            <a:lstStyle/>
+            <a:p>
+              <a:r>
+                <a:rPr lang="en-GB" sz="1400" dirty="0" smtClean="0"/>
+                <a:t>0</a:t>
+              </a:r>
+              <a:endParaRPr lang="en-GB" sz="1400" dirty="0"/>
+            </a:p>
+          </p:txBody>
+        </p:sp>
+        <p:sp>
+          <p:nvSpPr>
+            <p:cNvPr id="144" name="TextBox 143"/>
+            <p:cNvSpPr txBox="1"/>
+            <p:nvPr/>
+          </p:nvSpPr>
+          <p:spPr>
+            <a:xfrm>
+              <a:off x="2131889" y="5416351"/>
+              <a:ext cx="276038" cy="307777"/>
+            </a:xfrm>
+            <a:prstGeom prst="rect">
+              <a:avLst/>
+            </a:prstGeom>
+            <a:noFill/>
+          </p:spPr>
+          <p:txBody>
+            <a:bodyPr wrap="none" rtlCol="0">
+              <a:spAutoFit/>
+            </a:bodyPr>
+            <a:lstStyle/>
+            <a:p>
+              <a:r>
+                <a:rPr lang="en-GB" sz="1400" dirty="0" smtClean="0"/>
+                <a:t>1</a:t>
+              </a:r>
+              <a:endParaRPr lang="en-GB" sz="1400" dirty="0"/>
+            </a:p>
+          </p:txBody>
+        </p:sp>
+        <p:sp>
+          <p:nvSpPr>
+            <p:cNvPr id="145" name="TextBox 144"/>
+            <p:cNvSpPr txBox="1"/>
+            <p:nvPr/>
+          </p:nvSpPr>
+          <p:spPr>
+            <a:xfrm>
+              <a:off x="2516139" y="5416351"/>
+              <a:ext cx="276038" cy="307777"/>
+            </a:xfrm>
+            <a:prstGeom prst="rect">
+              <a:avLst/>
+            </a:prstGeom>
+            <a:noFill/>
+          </p:spPr>
+          <p:txBody>
+            <a:bodyPr wrap="none" rtlCol="0">
+              <a:spAutoFit/>
+            </a:bodyPr>
+            <a:lstStyle/>
+            <a:p>
+              <a:r>
+                <a:rPr lang="en-GB" sz="1400" dirty="0" smtClean="0"/>
+                <a:t>0</a:t>
+              </a:r>
+              <a:endParaRPr lang="en-GB" sz="1400" dirty="0"/>
+            </a:p>
+          </p:txBody>
+        </p:sp>
+        <p:sp>
+          <p:nvSpPr>
+            <p:cNvPr id="146" name="TextBox 145"/>
+            <p:cNvSpPr txBox="1"/>
+            <p:nvPr/>
+          </p:nvSpPr>
+          <p:spPr>
+            <a:xfrm>
+              <a:off x="3416808" y="5416351"/>
+              <a:ext cx="276038" cy="307777"/>
+            </a:xfrm>
+            <a:prstGeom prst="rect">
+              <a:avLst/>
+            </a:prstGeom>
+            <a:noFill/>
+          </p:spPr>
+          <p:txBody>
+            <a:bodyPr wrap="none" rtlCol="0">
+              <a:spAutoFit/>
+            </a:bodyPr>
+            <a:lstStyle/>
+            <a:p>
+              <a:r>
+                <a:rPr lang="en-GB" sz="1400" dirty="0" smtClean="0"/>
+                <a:t>0</a:t>
+              </a:r>
+              <a:endParaRPr lang="en-GB" sz="1400" dirty="0"/>
+            </a:p>
+          </p:txBody>
+        </p:sp>
+        <p:sp>
+          <p:nvSpPr>
+            <p:cNvPr id="147" name="TextBox 146"/>
+            <p:cNvSpPr txBox="1"/>
+            <p:nvPr/>
+          </p:nvSpPr>
+          <p:spPr>
+            <a:xfrm>
+              <a:off x="4164313" y="5416351"/>
+              <a:ext cx="276038" cy="307777"/>
+            </a:xfrm>
+            <a:prstGeom prst="rect">
+              <a:avLst/>
+            </a:prstGeom>
+            <a:noFill/>
+          </p:spPr>
+          <p:txBody>
+            <a:bodyPr wrap="none" rtlCol="0">
+              <a:spAutoFit/>
+            </a:bodyPr>
+            <a:lstStyle/>
+            <a:p>
+              <a:r>
+                <a:rPr lang="en-GB" sz="1400" dirty="0" smtClean="0"/>
+                <a:t>0</a:t>
+              </a:r>
+              <a:endParaRPr lang="en-GB" sz="1400" dirty="0"/>
+            </a:p>
+          </p:txBody>
+        </p:sp>
+        <p:sp>
+          <p:nvSpPr>
+            <p:cNvPr id="148" name="TextBox 147"/>
+            <p:cNvSpPr txBox="1"/>
+            <p:nvPr/>
+          </p:nvSpPr>
+          <p:spPr>
+            <a:xfrm>
+              <a:off x="4474225" y="5416351"/>
+              <a:ext cx="276038" cy="307777"/>
+            </a:xfrm>
+            <a:prstGeom prst="rect">
+              <a:avLst/>
+            </a:prstGeom>
+            <a:noFill/>
+          </p:spPr>
+          <p:txBody>
+            <a:bodyPr wrap="none" rtlCol="0">
+              <a:spAutoFit/>
+            </a:bodyPr>
+            <a:lstStyle/>
+            <a:p>
+              <a:r>
+                <a:rPr lang="en-GB" sz="1400" dirty="0" smtClean="0"/>
+                <a:t>1</a:t>
+              </a:r>
+              <a:endParaRPr lang="en-GB" sz="1400" dirty="0"/>
+            </a:p>
+          </p:txBody>
+        </p:sp>
+        <p:sp>
+          <p:nvSpPr>
+            <p:cNvPr id="149" name="TextBox 148"/>
+            <p:cNvSpPr txBox="1"/>
+            <p:nvPr/>
+          </p:nvSpPr>
+          <p:spPr>
+            <a:xfrm>
+              <a:off x="4837908" y="5416351"/>
+              <a:ext cx="276038" cy="307777"/>
+            </a:xfrm>
+            <a:prstGeom prst="rect">
+              <a:avLst/>
+            </a:prstGeom>
+            <a:noFill/>
+          </p:spPr>
+          <p:txBody>
+            <a:bodyPr wrap="none" rtlCol="0">
+              <a:spAutoFit/>
+            </a:bodyPr>
+            <a:lstStyle/>
+            <a:p>
+              <a:r>
+                <a:rPr lang="en-GB" sz="1400" dirty="0"/>
+                <a:t>0</a:t>
+              </a:r>
+            </a:p>
+          </p:txBody>
+        </p:sp>
+        <p:sp>
+          <p:nvSpPr>
+            <p:cNvPr id="150" name="TextBox 149"/>
+            <p:cNvSpPr txBox="1"/>
+            <p:nvPr/>
+          </p:nvSpPr>
+          <p:spPr>
+            <a:xfrm>
+              <a:off x="5371229" y="5416351"/>
+              <a:ext cx="276038" cy="307777"/>
+            </a:xfrm>
+            <a:prstGeom prst="rect">
+              <a:avLst/>
+            </a:prstGeom>
+            <a:noFill/>
+          </p:spPr>
+          <p:txBody>
+            <a:bodyPr wrap="none" rtlCol="0">
+              <a:spAutoFit/>
+            </a:bodyPr>
+            <a:lstStyle/>
+            <a:p>
+              <a:r>
+                <a:rPr lang="en-GB" sz="1400" dirty="0"/>
+                <a:t>0</a:t>
+              </a:r>
+            </a:p>
+          </p:txBody>
+        </p:sp>
+        <p:sp>
+          <p:nvSpPr>
+            <p:cNvPr id="151" name="TextBox 150"/>
+            <p:cNvSpPr txBox="1"/>
+            <p:nvPr/>
+          </p:nvSpPr>
+          <p:spPr>
+            <a:xfrm>
+              <a:off x="1142504" y="6215731"/>
+              <a:ext cx="276038" cy="307777"/>
+            </a:xfrm>
+            <a:prstGeom prst="rect">
+              <a:avLst/>
+            </a:prstGeom>
+            <a:solidFill>
+              <a:schemeClr val="bg1"/>
+            </a:solidFill>
+          </p:spPr>
+          <p:txBody>
+            <a:bodyPr wrap="none" rtlCol="0">
+              <a:spAutoFit/>
+            </a:bodyPr>
+            <a:lstStyle/>
+            <a:p>
+              <a:r>
+                <a:rPr lang="en-GB" sz="1400" dirty="0" smtClean="0"/>
+                <a:t>0</a:t>
+              </a:r>
+              <a:endParaRPr lang="en-GB" sz="1400" dirty="0"/>
+            </a:p>
+          </p:txBody>
+        </p:sp>
+        <p:sp>
+          <p:nvSpPr>
+            <p:cNvPr id="152" name="TextBox 151"/>
+            <p:cNvSpPr txBox="1"/>
+            <p:nvPr/>
+          </p:nvSpPr>
+          <p:spPr>
+            <a:xfrm>
+              <a:off x="1052736" y="5848399"/>
+              <a:ext cx="365806" cy="307777"/>
+            </a:xfrm>
+            <a:prstGeom prst="rect">
+              <a:avLst/>
+            </a:prstGeom>
+            <a:solidFill>
+              <a:schemeClr val="bg1"/>
+            </a:solidFill>
+          </p:spPr>
+          <p:txBody>
+            <a:bodyPr wrap="none" rtlCol="0">
+              <a:spAutoFit/>
+            </a:bodyPr>
+            <a:lstStyle/>
+            <a:p>
+              <a:r>
+                <a:rPr lang="en-GB" sz="1400" dirty="0" smtClean="0"/>
+                <a:t>+1</a:t>
+              </a:r>
+              <a:endParaRPr lang="en-GB" sz="1400" dirty="0"/>
+            </a:p>
+          </p:txBody>
+        </p:sp>
+        <p:sp>
+          <p:nvSpPr>
+            <p:cNvPr id="153" name="TextBox 152"/>
+            <p:cNvSpPr txBox="1"/>
+            <p:nvPr/>
+          </p:nvSpPr>
+          <p:spPr>
+            <a:xfrm>
+              <a:off x="1088002" y="6578351"/>
+              <a:ext cx="330540" cy="307777"/>
+            </a:xfrm>
+            <a:prstGeom prst="rect">
+              <a:avLst/>
+            </a:prstGeom>
+            <a:solidFill>
+              <a:schemeClr val="bg1"/>
+            </a:solidFill>
+          </p:spPr>
+          <p:txBody>
+            <a:bodyPr wrap="none" rtlCol="0">
+              <a:spAutoFit/>
+            </a:bodyPr>
+            <a:lstStyle/>
+            <a:p>
+              <a:r>
+                <a:rPr lang="en-GB" sz="1400" dirty="0" smtClean="0"/>
+                <a:t>-1</a:t>
+              </a:r>
+              <a:endParaRPr lang="en-GB" sz="1400" dirty="0"/>
+            </a:p>
+          </p:txBody>
+        </p:sp>
+        <p:cxnSp>
+          <p:nvCxnSpPr>
+            <p:cNvPr id="155" name="Straight Connector 154"/>
+            <p:cNvCxnSpPr/>
+            <p:nvPr/>
+          </p:nvCxnSpPr>
+          <p:spPr>
+            <a:xfrm>
+              <a:off x="836712" y="5132751"/>
+              <a:ext cx="5040560" cy="0"/>
+            </a:xfrm>
+            <a:prstGeom prst="line">
+              <a:avLst/>
+            </a:prstGeom>
+          </p:spPr>
+          <p:style>
+            <a:lnRef idx="1">
+              <a:schemeClr val="accent1"/>
+            </a:lnRef>
+            <a:fillRef idx="0">
+              <a:schemeClr val="accent1"/>
+            </a:fillRef>
+            <a:effectRef idx="0">
+              <a:schemeClr val="accent1"/>
+            </a:effectRef>
+            <a:fontRef idx="minor">
+              <a:schemeClr val="tx1"/>
+            </a:fontRef>
+          </p:style>
+        </p:cxnSp>
+        <p:cxnSp>
+          <p:nvCxnSpPr>
+            <p:cNvPr id="157" name="Straight Connector 156"/>
+            <p:cNvCxnSpPr/>
+            <p:nvPr/>
+          </p:nvCxnSpPr>
+          <p:spPr>
+            <a:xfrm>
+              <a:off x="836712" y="5724128"/>
+              <a:ext cx="5040560" cy="0"/>
+            </a:xfrm>
+            <a:prstGeom prst="line">
+              <a:avLst/>
+            </a:prstGeom>
+          </p:spPr>
+          <p:style>
+            <a:lnRef idx="1">
+              <a:schemeClr val="accent1"/>
+            </a:lnRef>
+            <a:fillRef idx="0">
+              <a:schemeClr val="accent1"/>
+            </a:fillRef>
+            <a:effectRef idx="0">
+              <a:schemeClr val="accent1"/>
+            </a:effectRef>
+            <a:fontRef idx="minor">
+              <a:schemeClr val="tx1"/>
+            </a:fontRef>
+          </p:style>
+        </p:cxnSp>
+      </p:grpSp>
+    </p:spTree>
+    <p:extLst>
+      <p:ext uri="{BB962C8B-B14F-4D97-AF65-F5344CB8AC3E}">
+        <p14:creationId xmlns:p14="http://schemas.microsoft.com/office/powerpoint/2010/main" val="4174712508"/>
+      </p:ext>
+    </p:extLst>
+  </p:cSld>
+  <p:clrMapOvr>
+    <a:masterClrMapping/>
+  </p:clrMapOvr>
+</p:sld>
+</file>
+
+<file path=ppt/slides/slide3.xml><?xml version="1.0" encoding="utf-8"?>
+<p:sld xmlns:a="http://schemas.openxmlformats.org/drawingml/2006/main" xmlns:r="http://schemas.openxmlformats.org/officeDocument/2006/relationships" xmlns:p="http://schemas.openxmlformats.org/presentationml/2006/main">
+  <p:cSld>
+    <p:spTree>
+      <p:nvGrpSpPr>
+        <p:cNvPr id="1" name=""/>
+        <p:cNvGrpSpPr/>
+        <p:nvPr/>
+      </p:nvGrpSpPr>
+      <p:grpSpPr>
+        <a:xfrm>
+          <a:off x="0" y="0"/>
+          <a:ext cx="0" cy="0"/>
+          <a:chOff x="0" y="0"/>
+          <a:chExt cx="0" cy="0"/>
+        </a:xfrm>
+      </p:grpSpPr>
       <p:pic>
         <p:nvPicPr>
           <p:cNvPr id="2" name="Picture 1"/>
@@ -5746,7 +8154,7 @@
 </p:sld>
 </file>
 
-<file path=ppt/slides/slide3.xml><?xml version="1.0" encoding="utf-8"?>
+<file path=ppt/slides/slide4.xml><?xml version="1.0" encoding="utf-8"?>
 <p:sld xmlns:a="http://schemas.openxmlformats.org/drawingml/2006/main" xmlns:r="http://schemas.openxmlformats.org/officeDocument/2006/relationships" xmlns:p="http://schemas.openxmlformats.org/presentationml/2006/main">
   <p:cSld>
     <p:spTree>

</xml_diff>